<commit_message>
Finished slides/notes on css
</commit_message>
<xml_diff>
--- a/slides/Unit 2 - LC 101 - Class 2.pptx
+++ b/slides/Unit 2 - LC 101 - Class 2.pptx
@@ -5,7 +5,7 @@
     <p:sldMasterId id="2147483659" r:id="rId1"/>
   </p:sldMasterIdLst>
   <p:notesMasterIdLst>
-    <p:notesMasterId r:id="rId17"/>
+    <p:notesMasterId r:id="rId19"/>
   </p:notesMasterIdLst>
   <p:sldIdLst>
     <p:sldId id="270" r:id="rId2"/>
@@ -18,11 +18,13 @@
     <p:sldId id="260" r:id="rId9"/>
     <p:sldId id="272" r:id="rId10"/>
     <p:sldId id="261" r:id="rId11"/>
-    <p:sldId id="262" r:id="rId12"/>
-    <p:sldId id="263" r:id="rId13"/>
-    <p:sldId id="264" r:id="rId14"/>
-    <p:sldId id="265" r:id="rId15"/>
-    <p:sldId id="266" r:id="rId16"/>
+    <p:sldId id="273" r:id="rId12"/>
+    <p:sldId id="262" r:id="rId13"/>
+    <p:sldId id="263" r:id="rId14"/>
+    <p:sldId id="264" r:id="rId15"/>
+    <p:sldId id="274" r:id="rId16"/>
+    <p:sldId id="265" r:id="rId17"/>
+    <p:sldId id="266" r:id="rId18"/>
   </p:sldIdLst>
   <p:sldSz cx="9144000" cy="5143500" type="screen16x9"/>
   <p:notesSz cx="6858000" cy="9144000"/>
@@ -7226,14 +7228,14 @@
               <a:buChar char="●"/>
             </a:pPr>
             <a:r>
-              <a:rPr lang="en" sz="2400">
+              <a:rPr lang="en" sz="2400" dirty="0">
                 <a:solidFill>
                   <a:schemeClr val="dk1"/>
                 </a:solidFill>
               </a:rPr>
               <a:t>&lt;style type="text/css"&gt;</a:t>
             </a:r>
-            <a:endParaRPr sz="2400">
+            <a:endParaRPr sz="2400" dirty="0">
               <a:solidFill>
                 <a:schemeClr val="dk1"/>
               </a:solidFill>
@@ -7253,14 +7255,14 @@
               <a:buNone/>
             </a:pPr>
             <a:r>
-              <a:rPr lang="en" sz="2400">
+              <a:rPr lang="en" sz="2400" dirty="0">
                 <a:solidFill>
                   <a:schemeClr val="dk1"/>
                 </a:solidFill>
               </a:rPr>
               <a:t>	p {</a:t>
             </a:r>
-            <a:endParaRPr sz="2400">
+            <a:endParaRPr sz="2400" dirty="0">
               <a:solidFill>
                 <a:schemeClr val="dk1"/>
               </a:solidFill>
@@ -7280,14 +7282,14 @@
               <a:buNone/>
             </a:pPr>
             <a:r>
-              <a:rPr lang="en" sz="2400">
+              <a:rPr lang="en" sz="2400" dirty="0">
                 <a:solidFill>
                   <a:schemeClr val="dk1"/>
                 </a:solidFill>
               </a:rPr>
               <a:t>		color: red;</a:t>
             </a:r>
-            <a:endParaRPr sz="2400">
+            <a:endParaRPr sz="2400" dirty="0">
               <a:solidFill>
                 <a:schemeClr val="dk1"/>
               </a:solidFill>
@@ -7307,14 +7309,14 @@
               <a:buNone/>
             </a:pPr>
             <a:r>
-              <a:rPr lang="en" sz="2400">
+              <a:rPr lang="en" sz="2400" dirty="0">
                 <a:solidFill>
                   <a:schemeClr val="dk1"/>
                 </a:solidFill>
               </a:rPr>
               <a:t>}</a:t>
             </a:r>
-            <a:endParaRPr sz="2400">
+            <a:endParaRPr sz="2400" dirty="0">
               <a:solidFill>
                 <a:schemeClr val="dk1"/>
               </a:solidFill>
@@ -7334,14 +7336,14 @@
               <a:buNone/>
             </a:pPr>
             <a:r>
-              <a:rPr lang="en" sz="2400">
+              <a:rPr lang="en" sz="2400" dirty="0">
                 <a:solidFill>
                   <a:schemeClr val="dk1"/>
                 </a:solidFill>
               </a:rPr>
               <a:t>&lt;/style&gt;</a:t>
             </a:r>
-            <a:endParaRPr sz="2400">
+            <a:endParaRPr sz="2400" dirty="0">
               <a:solidFill>
                 <a:schemeClr val="dk1"/>
               </a:solidFill>
@@ -7360,7 +7362,7 @@
               </a:spcAft>
               <a:buNone/>
             </a:pPr>
-            <a:endParaRPr sz="2400">
+            <a:endParaRPr sz="2400" dirty="0">
               <a:solidFill>
                 <a:schemeClr val="dk1"/>
               </a:solidFill>
@@ -7384,14 +7386,14 @@
               <a:buChar char="●"/>
             </a:pPr>
             <a:r>
-              <a:rPr lang="en" sz="2400">
+              <a:rPr lang="en" sz="2400" dirty="0">
                 <a:solidFill>
                   <a:schemeClr val="dk1"/>
                 </a:solidFill>
               </a:rPr>
               <a:t>External style sheet</a:t>
             </a:r>
-            <a:endParaRPr sz="2400">
+            <a:endParaRPr sz="2400" dirty="0">
               <a:solidFill>
                 <a:schemeClr val="dk1"/>
               </a:solidFill>
@@ -7415,14 +7417,14 @@
               <a:buChar char="○"/>
             </a:pPr>
             <a:r>
-              <a:rPr lang="en" sz="2400">
+              <a:rPr lang="en" sz="2400" dirty="0">
                 <a:solidFill>
                   <a:schemeClr val="dk1"/>
                 </a:solidFill>
               </a:rPr>
               <a:t>Basic-styles.css</a:t>
             </a:r>
-            <a:endParaRPr sz="2400">
+            <a:endParaRPr sz="2400" dirty="0">
               <a:solidFill>
                 <a:schemeClr val="dk1"/>
               </a:solidFill>
@@ -7446,7 +7448,7 @@
               <a:buChar char="○"/>
             </a:pPr>
             <a:r>
-              <a:rPr lang="en" sz="2400">
+              <a:rPr lang="en" sz="2400" dirty="0">
                 <a:solidFill>
                   <a:schemeClr val="dk1"/>
                 </a:solidFill>
@@ -7454,7 +7456,7 @@
               <a:t>contents would be </a:t>
             </a:r>
             <a:r>
-              <a:rPr lang="en" sz="2400" u="sng">
+              <a:rPr lang="en" sz="2400" u="sng" dirty="0">
                 <a:solidFill>
                   <a:schemeClr val="dk1"/>
                 </a:solidFill>
@@ -7462,14 +7464,14 @@
               <a:t>selectors</a:t>
             </a:r>
             <a:r>
-              <a:rPr lang="en" sz="2400">
+              <a:rPr lang="en" sz="2400" dirty="0">
                 <a:solidFill>
                   <a:schemeClr val="dk1"/>
                 </a:solidFill>
               </a:rPr>
               <a:t> and css rules</a:t>
             </a:r>
-            <a:endParaRPr sz="2400">
+            <a:endParaRPr sz="2400" dirty="0">
               <a:solidFill>
                 <a:schemeClr val="dk1"/>
               </a:solidFill>
@@ -7488,7 +7490,7 @@
               </a:spcAft>
               <a:buNone/>
             </a:pPr>
-            <a:endParaRPr sz="2400">
+            <a:endParaRPr sz="2400" dirty="0">
               <a:solidFill>
                 <a:srgbClr val="FFFFFF"/>
               </a:solidFill>
@@ -7507,7 +7509,7 @@
               </a:spcAft>
               <a:buNone/>
             </a:pPr>
-            <a:endParaRPr sz="2400">
+            <a:endParaRPr sz="2400" dirty="0">
               <a:solidFill>
                 <a:schemeClr val="dk1"/>
               </a:solidFill>
@@ -7526,7 +7528,7 @@
               </a:spcAft>
               <a:buNone/>
             </a:pPr>
-            <a:endParaRPr sz="2200">
+            <a:endParaRPr sz="2200" dirty="0">
               <a:solidFill>
                 <a:srgbClr val="FFFFFF"/>
               </a:solidFill>
@@ -7545,7 +7547,7 @@
               </a:spcAft>
               <a:buNone/>
             </a:pPr>
-            <a:endParaRPr sz="2200">
+            <a:endParaRPr sz="2200" dirty="0">
               <a:solidFill>
                 <a:srgbClr val="FFFFFF"/>
               </a:solidFill>
@@ -7564,7 +7566,7 @@
               </a:spcAft>
               <a:buNone/>
             </a:pPr>
-            <a:endParaRPr sz="2400">
+            <a:endParaRPr sz="2400" dirty="0">
               <a:solidFill>
                 <a:srgbClr val="FFFFFF"/>
               </a:solidFill>
@@ -7580,7 +7582,7 @@
               </a:spcAft>
               <a:buNone/>
             </a:pPr>
-            <a:endParaRPr sz="2400">
+            <a:endParaRPr sz="2400" dirty="0">
               <a:solidFill>
                 <a:srgbClr val="FFFFFF"/>
               </a:solidFill>
@@ -8542,6 +8544,64 @@
 </file>
 
 <file path=ppt/slides/slide11.xml><?xml version="1.0" encoding="utf-8"?>
+<p:sld xmlns:a="http://schemas.openxmlformats.org/drawingml/2006/main" xmlns:r="http://schemas.openxmlformats.org/officeDocument/2006/relationships" xmlns:p="http://schemas.openxmlformats.org/presentationml/2006/main">
+  <p:cSld>
+    <p:spTree>
+      <p:nvGrpSpPr>
+        <p:cNvPr id="1" name=""/>
+        <p:cNvGrpSpPr/>
+        <p:nvPr/>
+      </p:nvGrpSpPr>
+      <p:grpSpPr>
+        <a:xfrm>
+          <a:off x="0" y="0"/>
+          <a:ext cx="0" cy="0"/>
+          <a:chOff x="0" y="0"/>
+          <a:chExt cx="0" cy="0"/>
+        </a:xfrm>
+      </p:grpSpPr>
+      <p:sp>
+        <p:nvSpPr>
+          <p:cNvPr id="2" name="Title 1">
+            <a:extLst>
+              <a:ext uri="{FF2B5EF4-FFF2-40B4-BE49-F238E27FC236}">
+                <a16:creationId xmlns:a16="http://schemas.microsoft.com/office/drawing/2014/main" id="{52845B50-28E8-4574-9B84-7FF15E0D4F3B}"/>
+              </a:ext>
+            </a:extLst>
+          </p:cNvPr>
+          <p:cNvSpPr>
+            <a:spLocks noGrp="1"/>
+          </p:cNvSpPr>
+          <p:nvPr>
+            <p:ph type="title"/>
+          </p:nvPr>
+        </p:nvSpPr>
+        <p:spPr/>
+        <p:txBody>
+          <a:bodyPr/>
+          <a:lstStyle/>
+          <a:p>
+            <a:r>
+              <a:rPr lang="en-US" dirty="0"/>
+              <a:t>Example</a:t>
+            </a:r>
+          </a:p>
+        </p:txBody>
+      </p:sp>
+    </p:spTree>
+    <p:extLst>
+      <p:ext uri="{BB962C8B-B14F-4D97-AF65-F5344CB8AC3E}">
+        <p14:creationId xmlns:p14="http://schemas.microsoft.com/office/powerpoint/2010/main" val="3615363358"/>
+      </p:ext>
+    </p:extLst>
+  </p:cSld>
+  <p:clrMapOvr>
+    <a:masterClrMapping/>
+  </p:clrMapOvr>
+</p:sld>
+</file>
+
+<file path=ppt/slides/slide12.xml><?xml version="1.0" encoding="utf-8"?>
 <p:sld xmlns:a="http://schemas.openxmlformats.org/drawingml/2006/main" xmlns:r="http://schemas.openxmlformats.org/officeDocument/2006/relationships" xmlns:p="http://schemas.openxmlformats.org/presentationml/2006/main">
   <p:cSld>
     <p:spTree>
@@ -9601,7 +9661,7 @@
 </p:sld>
 </file>
 
-<file path=ppt/slides/slide12.xml><?xml version="1.0" encoding="utf-8"?>
+<file path=ppt/slides/slide13.xml><?xml version="1.0" encoding="utf-8"?>
 <p:sld xmlns:a="http://schemas.openxmlformats.org/drawingml/2006/main" xmlns:r="http://schemas.openxmlformats.org/officeDocument/2006/relationships" xmlns:p="http://schemas.openxmlformats.org/presentationml/2006/main">
   <p:cSld>
     <p:spTree>
@@ -10912,7 +10972,7 @@
 </p:sld>
 </file>
 
-<file path=ppt/slides/slide13.xml><?xml version="1.0" encoding="utf-8"?>
+<file path=ppt/slides/slide14.xml><?xml version="1.0" encoding="utf-8"?>
 <p:sld xmlns:a="http://schemas.openxmlformats.org/drawingml/2006/main" xmlns:r="http://schemas.openxmlformats.org/officeDocument/2006/relationships" xmlns:p="http://schemas.openxmlformats.org/presentationml/2006/main">
   <p:cSld>
     <p:spTree>
@@ -11013,7 +11073,7 @@
               <a:buChar char="●"/>
             </a:pPr>
             <a:r>
-              <a:rPr lang="en" sz="2400">
+              <a:rPr lang="en" sz="2400" dirty="0">
                 <a:solidFill>
                   <a:schemeClr val="dk1"/>
                 </a:solidFill>
@@ -11021,7 +11081,7 @@
               <a:t>Uses the </a:t>
             </a:r>
             <a:r>
-              <a:rPr lang="en" sz="2400" u="sng">
+              <a:rPr lang="en" sz="2400" u="sng" dirty="0">
                 <a:solidFill>
                   <a:schemeClr val="dk1"/>
                 </a:solidFill>
@@ -11029,14 +11089,14 @@
               <a:t>ID attribute</a:t>
             </a:r>
             <a:r>
-              <a:rPr lang="en" sz="2400">
+              <a:rPr lang="en" sz="2400" dirty="0">
                 <a:solidFill>
                   <a:schemeClr val="dk1"/>
                 </a:solidFill>
               </a:rPr>
               <a:t> of an element</a:t>
             </a:r>
-            <a:endParaRPr sz="2400">
+            <a:endParaRPr sz="2400" dirty="0">
               <a:solidFill>
                 <a:schemeClr val="dk1"/>
               </a:solidFill>
@@ -11057,14 +11117,14 @@
               <a:buChar char="●"/>
             </a:pPr>
             <a:r>
-              <a:rPr lang="en" sz="2400">
+              <a:rPr lang="en" sz="2400" dirty="0">
                 <a:solidFill>
                   <a:schemeClr val="dk1"/>
                 </a:solidFill>
               </a:rPr>
               <a:t>&lt;h1 id="main-page-title"&gt;Welcome to LC101&lt;/h1&gt;</a:t>
             </a:r>
-            <a:endParaRPr sz="2400">
+            <a:endParaRPr sz="2400" dirty="0">
               <a:solidFill>
                 <a:schemeClr val="dk1"/>
               </a:solidFill>
@@ -11085,14 +11145,14 @@
               <a:buChar char="○"/>
             </a:pPr>
             <a:r>
-              <a:rPr lang="en" sz="2400">
+              <a:rPr lang="en" sz="2400" dirty="0">
                 <a:solidFill>
                   <a:schemeClr val="dk1"/>
                 </a:solidFill>
               </a:rPr>
               <a:t>There should only be ONE of these on page</a:t>
             </a:r>
-            <a:endParaRPr sz="2400">
+            <a:endParaRPr sz="2400" dirty="0">
               <a:solidFill>
                 <a:schemeClr val="dk1"/>
               </a:solidFill>
@@ -11113,14 +11173,14 @@
               <a:buChar char="○"/>
             </a:pPr>
             <a:r>
-              <a:rPr lang="en" sz="2400">
+              <a:rPr lang="en" sz="2400" dirty="0">
                 <a:solidFill>
                   <a:schemeClr val="dk1"/>
                 </a:solidFill>
               </a:rPr>
               <a:t>Don’t use same ID twice on page!</a:t>
             </a:r>
-            <a:endParaRPr sz="2400">
+            <a:endParaRPr sz="2400" dirty="0">
               <a:solidFill>
                 <a:schemeClr val="dk1"/>
               </a:solidFill>
@@ -11141,14 +11201,14 @@
               <a:buChar char="●"/>
             </a:pPr>
             <a:r>
-              <a:rPr lang="en" sz="2400">
+              <a:rPr lang="en" sz="2400" dirty="0">
                 <a:solidFill>
                   <a:schemeClr val="dk1"/>
                 </a:solidFill>
               </a:rPr>
               <a:t>&lt;style type="text/css"&gt;</a:t>
             </a:r>
-            <a:endParaRPr sz="2400">
+            <a:endParaRPr sz="2400" dirty="0">
               <a:solidFill>
                 <a:schemeClr val="dk1"/>
               </a:solidFill>
@@ -11165,14 +11225,14 @@
               <a:buNone/>
             </a:pPr>
             <a:r>
-              <a:rPr lang="en" sz="2400">
+              <a:rPr lang="en" sz="2400" dirty="0">
                 <a:solidFill>
                   <a:schemeClr val="dk1"/>
                 </a:solidFill>
               </a:rPr>
               <a:t>		#main-page-title {</a:t>
             </a:r>
-            <a:endParaRPr sz="2400">
+            <a:endParaRPr sz="2400" dirty="0">
               <a:solidFill>
                 <a:schemeClr val="dk1"/>
               </a:solidFill>
@@ -11189,14 +11249,14 @@
               <a:buNone/>
             </a:pPr>
             <a:r>
-              <a:rPr lang="en" sz="2400">
+              <a:rPr lang="en" sz="2400" dirty="0">
                 <a:solidFill>
                   <a:schemeClr val="dk1"/>
                 </a:solidFill>
               </a:rPr>
               <a:t>			font-size: 20px;</a:t>
             </a:r>
-            <a:endParaRPr sz="2400">
+            <a:endParaRPr sz="2400" dirty="0">
               <a:solidFill>
                 <a:schemeClr val="dk1"/>
               </a:solidFill>
@@ -11213,14 +11273,14 @@
               <a:buNone/>
             </a:pPr>
             <a:r>
-              <a:rPr lang="en" sz="2400">
+              <a:rPr lang="en" sz="2400" dirty="0">
                 <a:solidFill>
                   <a:schemeClr val="dk1"/>
                 </a:solidFill>
               </a:rPr>
               <a:t>			text-align: center;</a:t>
             </a:r>
-            <a:endParaRPr sz="2400">
+            <a:endParaRPr sz="2400" dirty="0">
               <a:solidFill>
                 <a:schemeClr val="dk1"/>
               </a:solidFill>
@@ -11237,14 +11297,14 @@
               <a:buNone/>
             </a:pPr>
             <a:r>
-              <a:rPr lang="en" sz="2400">
+              <a:rPr lang="en" sz="2400" dirty="0">
                 <a:solidFill>
                   <a:schemeClr val="dk1"/>
                 </a:solidFill>
               </a:rPr>
               <a:t>}</a:t>
             </a:r>
-            <a:endParaRPr sz="2400">
+            <a:endParaRPr sz="2400" dirty="0">
               <a:solidFill>
                 <a:schemeClr val="dk1"/>
               </a:solidFill>
@@ -11261,14 +11321,14 @@
               <a:buNone/>
             </a:pPr>
             <a:r>
-              <a:rPr lang="en" sz="2400">
+              <a:rPr lang="en" sz="2400" dirty="0">
                 <a:solidFill>
                   <a:schemeClr val="dk1"/>
                 </a:solidFill>
               </a:rPr>
               <a:t>&lt;/style&gt;</a:t>
             </a:r>
-            <a:endParaRPr sz="2400">
+            <a:endParaRPr sz="2400" dirty="0">
               <a:solidFill>
                 <a:schemeClr val="dk1"/>
               </a:solidFill>
@@ -11287,7 +11347,7 @@
               </a:spcAft>
               <a:buNone/>
             </a:pPr>
-            <a:endParaRPr sz="2400">
+            <a:endParaRPr sz="2400" dirty="0">
               <a:solidFill>
                 <a:srgbClr val="FFFFFF"/>
               </a:solidFill>
@@ -11306,7 +11366,7 @@
               </a:spcAft>
               <a:buNone/>
             </a:pPr>
-            <a:endParaRPr sz="2400">
+            <a:endParaRPr sz="2400" dirty="0">
               <a:solidFill>
                 <a:schemeClr val="dk1"/>
               </a:solidFill>
@@ -11325,7 +11385,7 @@
               </a:spcAft>
               <a:buNone/>
             </a:pPr>
-            <a:endParaRPr sz="2200">
+            <a:endParaRPr sz="2200" dirty="0">
               <a:solidFill>
                 <a:srgbClr val="FFFFFF"/>
               </a:solidFill>
@@ -11344,7 +11404,7 @@
               </a:spcAft>
               <a:buNone/>
             </a:pPr>
-            <a:endParaRPr sz="2200">
+            <a:endParaRPr sz="2200" dirty="0">
               <a:solidFill>
                 <a:srgbClr val="FFFFFF"/>
               </a:solidFill>
@@ -11363,7 +11423,7 @@
               </a:spcAft>
               <a:buNone/>
             </a:pPr>
-            <a:endParaRPr sz="2400">
+            <a:endParaRPr sz="2400" dirty="0">
               <a:solidFill>
                 <a:srgbClr val="FFFFFF"/>
               </a:solidFill>
@@ -11379,7 +11439,7 @@
               </a:spcAft>
               <a:buNone/>
             </a:pPr>
-            <a:endParaRPr sz="2400">
+            <a:endParaRPr sz="2400" dirty="0">
               <a:solidFill>
                 <a:srgbClr val="FFFFFF"/>
               </a:solidFill>
@@ -12401,7 +12461,65 @@
 </p:sld>
 </file>
 
-<file path=ppt/slides/slide14.xml><?xml version="1.0" encoding="utf-8"?>
+<file path=ppt/slides/slide15.xml><?xml version="1.0" encoding="utf-8"?>
+<p:sld xmlns:a="http://schemas.openxmlformats.org/drawingml/2006/main" xmlns:r="http://schemas.openxmlformats.org/officeDocument/2006/relationships" xmlns:p="http://schemas.openxmlformats.org/presentationml/2006/main">
+  <p:cSld>
+    <p:spTree>
+      <p:nvGrpSpPr>
+        <p:cNvPr id="1" name=""/>
+        <p:cNvGrpSpPr/>
+        <p:nvPr/>
+      </p:nvGrpSpPr>
+      <p:grpSpPr>
+        <a:xfrm>
+          <a:off x="0" y="0"/>
+          <a:ext cx="0" cy="0"/>
+          <a:chOff x="0" y="0"/>
+          <a:chExt cx="0" cy="0"/>
+        </a:xfrm>
+      </p:grpSpPr>
+      <p:sp>
+        <p:nvSpPr>
+          <p:cNvPr id="2" name="Title 1">
+            <a:extLst>
+              <a:ext uri="{FF2B5EF4-FFF2-40B4-BE49-F238E27FC236}">
+                <a16:creationId xmlns:a16="http://schemas.microsoft.com/office/drawing/2014/main" id="{52845B50-28E8-4574-9B84-7FF15E0D4F3B}"/>
+              </a:ext>
+            </a:extLst>
+          </p:cNvPr>
+          <p:cNvSpPr>
+            <a:spLocks noGrp="1"/>
+          </p:cNvSpPr>
+          <p:nvPr>
+            <p:ph type="title"/>
+          </p:nvPr>
+        </p:nvSpPr>
+        <p:spPr/>
+        <p:txBody>
+          <a:bodyPr/>
+          <a:lstStyle/>
+          <a:p>
+            <a:r>
+              <a:rPr lang="en-US" dirty="0"/>
+              <a:t>Example</a:t>
+            </a:r>
+          </a:p>
+        </p:txBody>
+      </p:sp>
+    </p:spTree>
+    <p:extLst>
+      <p:ext uri="{BB962C8B-B14F-4D97-AF65-F5344CB8AC3E}">
+        <p14:creationId xmlns:p14="http://schemas.microsoft.com/office/powerpoint/2010/main" val="1585979267"/>
+      </p:ext>
+    </p:extLst>
+  </p:cSld>
+  <p:clrMapOvr>
+    <a:masterClrMapping/>
+  </p:clrMapOvr>
+</p:sld>
+</file>
+
+<file path=ppt/slides/slide16.xml><?xml version="1.0" encoding="utf-8"?>
 <p:sld xmlns:a="http://schemas.openxmlformats.org/drawingml/2006/main" xmlns:r="http://schemas.openxmlformats.org/officeDocument/2006/relationships" xmlns:p="http://schemas.openxmlformats.org/presentationml/2006/main">
   <p:cSld>
     <p:spTree>
@@ -13381,7 +13499,7 @@
 </p:sld>
 </file>
 
-<file path=ppt/slides/slide15.xml><?xml version="1.0" encoding="utf-8"?>
+<file path=ppt/slides/slide17.xml><?xml version="1.0" encoding="utf-8"?>
 <p:sld xmlns:a="http://schemas.openxmlformats.org/drawingml/2006/main" xmlns:r="http://schemas.openxmlformats.org/officeDocument/2006/relationships" xmlns:p="http://schemas.openxmlformats.org/presentationml/2006/main">
   <p:cSld>
     <p:spTree>

</xml_diff>

<commit_message>
Edited files, need to finish git examples
</commit_message>
<xml_diff>
--- a/slides/Unit 2 - LC 101 - Class 2.pptx
+++ b/slides/Unit 2 - LC 101 - Class 2.pptx
@@ -5,7 +5,7 @@
     <p:sldMasterId id="2147483659" r:id="rId1"/>
   </p:sldMasterIdLst>
   <p:notesMasterIdLst>
-    <p:notesMasterId r:id="rId23"/>
+    <p:notesMasterId r:id="rId26"/>
   </p:notesMasterIdLst>
   <p:sldIdLst>
     <p:sldId id="270" r:id="rId2"/>
@@ -29,6 +29,9 @@
     <p:sldId id="265" r:id="rId20"/>
     <p:sldId id="278" r:id="rId21"/>
     <p:sldId id="266" r:id="rId22"/>
+    <p:sldId id="282" r:id="rId23"/>
+    <p:sldId id="279" r:id="rId24"/>
+    <p:sldId id="281" r:id="rId25"/>
   </p:sldIdLst>
   <p:sldSz cx="9144000" cy="5143500" type="screen16x9"/>
   <p:notesSz cx="6858000" cy="9144000"/>
@@ -1033,7 +1036,7 @@
           <a:p>
             <a:r>
               <a:rPr lang="en-US" dirty="0"/>
-              <a:t>cd lc101/class2</a:t>
+              <a:t>cd lc101/class2/examples</a:t>
             </a:r>
           </a:p>
           <a:p>
@@ -1123,7 +1126,7 @@
           <a:p>
             <a:r>
               <a:rPr lang="en-US" dirty="0"/>
-              <a:t>cd lc101/class2</a:t>
+              <a:t>cd lc101/class2/examples</a:t>
             </a:r>
           </a:p>
           <a:p>
@@ -1614,7 +1617,7 @@
           <a:p>
             <a:r>
               <a:rPr lang="en-US" dirty="0"/>
-              <a:t>cd lc101/class2</a:t>
+              <a:t>cd lc101/class2/examples</a:t>
             </a:r>
           </a:p>
           <a:p>
@@ -2093,18 +2096,19 @@
           <a:lstStyle/>
           <a:p>
             <a:r>
+              <a:rPr lang="en-US" dirty="0"/>
+              <a:t>Show how to create new Branches HTML</a:t>
+            </a:r>
+          </a:p>
+          <a:p>
+            <a:r>
               <a:rPr lang="en-US" dirty="0" err="1"/>
               <a:t>Flicklist</a:t>
             </a:r>
             <a:r>
               <a:rPr lang="en-US" dirty="0"/>
-              <a:t> branches to show how </a:t>
+              <a:t> branches to show how many branches etc.</a:t>
             </a:r>
-            <a:r>
-              <a:rPr lang="en-US"/>
-              <a:t>many branches etc.</a:t>
-            </a:r>
-            <a:endParaRPr lang="en-US" dirty="0"/>
           </a:p>
         </p:txBody>
       </p:sp>
@@ -2225,6 +2229,253 @@
 </p:notes>
 </file>
 
+<file path=ppt/notesSlides/notesSlide22.xml><?xml version="1.0" encoding="utf-8"?>
+<p:notes xmlns:a="http://schemas.openxmlformats.org/drawingml/2006/main" xmlns:r="http://schemas.openxmlformats.org/officeDocument/2006/relationships" xmlns:p="http://schemas.openxmlformats.org/presentationml/2006/main">
+  <p:cSld>
+    <p:spTree>
+      <p:nvGrpSpPr>
+        <p:cNvPr id="1" name=""/>
+        <p:cNvGrpSpPr/>
+        <p:nvPr/>
+      </p:nvGrpSpPr>
+      <p:grpSpPr>
+        <a:xfrm>
+          <a:off x="0" y="0"/>
+          <a:ext cx="0" cy="0"/>
+          <a:chOff x="0" y="0"/>
+          <a:chExt cx="0" cy="0"/>
+        </a:xfrm>
+      </p:grpSpPr>
+      <p:sp>
+        <p:nvSpPr>
+          <p:cNvPr id="2" name="Slide Image Placeholder 1"/>
+          <p:cNvSpPr>
+            <a:spLocks noGrp="1" noRot="1" noChangeAspect="1"/>
+          </p:cNvSpPr>
+          <p:nvPr>
+            <p:ph type="sldImg"/>
+          </p:nvPr>
+        </p:nvSpPr>
+        <p:spPr>
+          <a:xfrm>
+            <a:off x="381000" y="685800"/>
+            <a:ext cx="6096000" cy="3429000"/>
+          </a:xfrm>
+        </p:spPr>
+      </p:sp>
+      <p:sp>
+        <p:nvSpPr>
+          <p:cNvPr id="3" name="Notes Placeholder 2"/>
+          <p:cNvSpPr>
+            <a:spLocks noGrp="1"/>
+          </p:cNvSpPr>
+          <p:nvPr>
+            <p:ph type="body" idx="1"/>
+          </p:nvPr>
+        </p:nvSpPr>
+        <p:spPr/>
+        <p:txBody>
+          <a:bodyPr/>
+          <a:lstStyle/>
+          <a:p>
+            <a:r>
+              <a:rPr lang="en-US" dirty="0"/>
+              <a:t>Force a merge conflict </a:t>
+            </a:r>
+            <a:r>
+              <a:rPr lang="en-US"/>
+              <a:t>in HTML-me-something</a:t>
+            </a:r>
+            <a:endParaRPr lang="en-US" dirty="0"/>
+          </a:p>
+        </p:txBody>
+      </p:sp>
+    </p:spTree>
+    <p:extLst>
+      <p:ext uri="{BB962C8B-B14F-4D97-AF65-F5344CB8AC3E}">
+        <p14:creationId xmlns:p14="http://schemas.microsoft.com/office/powerpoint/2010/main" val="3922236139"/>
+      </p:ext>
+    </p:extLst>
+  </p:cSld>
+  <p:clrMapOvr>
+    <a:masterClrMapping/>
+  </p:clrMapOvr>
+</p:notes>
+</file>
+
+<file path=ppt/notesSlides/notesSlide23.xml><?xml version="1.0" encoding="utf-8"?>
+<p:notes xmlns:a="http://schemas.openxmlformats.org/drawingml/2006/main" xmlns:r="http://schemas.openxmlformats.org/officeDocument/2006/relationships" xmlns:p="http://schemas.openxmlformats.org/presentationml/2006/main">
+  <p:cSld>
+    <p:spTree>
+      <p:nvGrpSpPr>
+        <p:cNvPr id="1" name=""/>
+        <p:cNvGrpSpPr/>
+        <p:nvPr/>
+      </p:nvGrpSpPr>
+      <p:grpSpPr>
+        <a:xfrm>
+          <a:off x="0" y="0"/>
+          <a:ext cx="0" cy="0"/>
+          <a:chOff x="0" y="0"/>
+          <a:chExt cx="0" cy="0"/>
+        </a:xfrm>
+      </p:grpSpPr>
+      <p:sp>
+        <p:nvSpPr>
+          <p:cNvPr id="2" name="Slide Image Placeholder 1"/>
+          <p:cNvSpPr>
+            <a:spLocks noGrp="1" noRot="1" noChangeAspect="1"/>
+          </p:cNvSpPr>
+          <p:nvPr>
+            <p:ph type="sldImg"/>
+          </p:nvPr>
+        </p:nvSpPr>
+        <p:spPr>
+          <a:xfrm>
+            <a:off x="381000" y="685800"/>
+            <a:ext cx="6096000" cy="3429000"/>
+          </a:xfrm>
+        </p:spPr>
+      </p:sp>
+      <p:sp>
+        <p:nvSpPr>
+          <p:cNvPr id="3" name="Notes Placeholder 2"/>
+          <p:cNvSpPr>
+            <a:spLocks noGrp="1"/>
+          </p:cNvSpPr>
+          <p:nvPr>
+            <p:ph type="body" idx="1"/>
+          </p:nvPr>
+        </p:nvSpPr>
+        <p:spPr/>
+        <p:txBody>
+          <a:bodyPr/>
+          <a:lstStyle/>
+          <a:p>
+            <a:r>
+              <a:rPr lang="en-US" dirty="0"/>
+              <a:t>Questions before moving on to the Studio?</a:t>
+            </a:r>
+          </a:p>
+        </p:txBody>
+      </p:sp>
+    </p:spTree>
+    <p:extLst>
+      <p:ext uri="{BB962C8B-B14F-4D97-AF65-F5344CB8AC3E}">
+        <p14:creationId xmlns:p14="http://schemas.microsoft.com/office/powerpoint/2010/main" val="3545629213"/>
+      </p:ext>
+    </p:extLst>
+  </p:cSld>
+  <p:clrMapOvr>
+    <a:masterClrMapping/>
+  </p:clrMapOvr>
+</p:notes>
+</file>
+
+<file path=ppt/notesSlides/notesSlide24.xml><?xml version="1.0" encoding="utf-8"?>
+<p:notes xmlns:a="http://schemas.openxmlformats.org/drawingml/2006/main" xmlns:r="http://schemas.openxmlformats.org/officeDocument/2006/relationships" xmlns:p="http://schemas.openxmlformats.org/presentationml/2006/main" showMasterSp="0" showMasterPhAnim="0">
+  <p:cSld>
+    <p:spTree>
+      <p:nvGrpSpPr>
+        <p:cNvPr id="1" name="Shape 111"/>
+        <p:cNvGrpSpPr/>
+        <p:nvPr/>
+      </p:nvGrpSpPr>
+      <p:grpSpPr>
+        <a:xfrm>
+          <a:off x="0" y="0"/>
+          <a:ext cx="0" cy="0"/>
+          <a:chOff x="0" y="0"/>
+          <a:chExt cx="0" cy="0"/>
+        </a:xfrm>
+      </p:grpSpPr>
+      <p:sp>
+        <p:nvSpPr>
+          <p:cNvPr id="112" name="Shape 112"/>
+          <p:cNvSpPr>
+            <a:spLocks noGrp="1" noRot="1" noChangeAspect="1"/>
+          </p:cNvSpPr>
+          <p:nvPr>
+            <p:ph type="sldImg" idx="2"/>
+          </p:nvPr>
+        </p:nvSpPr>
+        <p:spPr>
+          <a:xfrm>
+            <a:off x="381000" y="685800"/>
+            <a:ext cx="6096000" cy="3429000"/>
+          </a:xfrm>
+          <a:custGeom>
+            <a:avLst/>
+            <a:gdLst/>
+            <a:ahLst/>
+            <a:cxnLst/>
+            <a:rect l="0" t="0" r="0" b="0"/>
+            <a:pathLst>
+              <a:path w="120000" h="120000" extrusionOk="0">
+                <a:moveTo>
+                  <a:pt x="0" y="0"/>
+                </a:moveTo>
+                <a:lnTo>
+                  <a:pt x="120000" y="0"/>
+                </a:lnTo>
+                <a:lnTo>
+                  <a:pt x="120000" y="120000"/>
+                </a:lnTo>
+                <a:lnTo>
+                  <a:pt x="0" y="120000"/>
+                </a:lnTo>
+                <a:close/>
+              </a:path>
+            </a:pathLst>
+          </a:custGeom>
+        </p:spPr>
+      </p:sp>
+      <p:sp>
+        <p:nvSpPr>
+          <p:cNvPr id="113" name="Shape 113"/>
+          <p:cNvSpPr txBox="1">
+            <a:spLocks noGrp="1"/>
+          </p:cNvSpPr>
+          <p:nvPr>
+            <p:ph type="body" idx="1"/>
+          </p:nvPr>
+        </p:nvSpPr>
+        <p:spPr>
+          <a:xfrm>
+            <a:off x="685800" y="4343400"/>
+            <a:ext cx="5486400" cy="4114800"/>
+          </a:xfrm>
+          <a:prstGeom prst="rect">
+            <a:avLst/>
+          </a:prstGeom>
+        </p:spPr>
+        <p:txBody>
+          <a:bodyPr spcFirstLastPara="1" wrap="square" lIns="91425" tIns="91425" rIns="91425" bIns="91425" anchor="t" anchorCtr="0">
+            <a:noAutofit/>
+          </a:bodyPr>
+          <a:lstStyle/>
+          <a:p>
+            <a:r>
+              <a:rPr lang="en-US" dirty="0"/>
+              <a:t>For odd numbered groups, find a person in a different group, or ask your TF to work with you. (We want as few TFs as possible coding so they can answer questions.)</a:t>
+            </a:r>
+            <a:endParaRPr dirty="0"/>
+          </a:p>
+        </p:txBody>
+      </p:sp>
+    </p:spTree>
+    <p:extLst>
+      <p:ext uri="{BB962C8B-B14F-4D97-AF65-F5344CB8AC3E}">
+        <p14:creationId xmlns:p14="http://schemas.microsoft.com/office/powerpoint/2010/main" val="1136858201"/>
+      </p:ext>
+    </p:extLst>
+  </p:cSld>
+  <p:clrMapOvr>
+    <a:masterClrMapping/>
+  </p:clrMapOvr>
+</p:notes>
+</file>
+
 <file path=ppt/notesSlides/notesSlide3.xml><?xml version="1.0" encoding="utf-8"?>
 <p:notes xmlns:a="http://schemas.openxmlformats.org/drawingml/2006/main" xmlns:r="http://schemas.openxmlformats.org/officeDocument/2006/relationships" xmlns:p="http://schemas.openxmlformats.org/presentationml/2006/main">
   <p:cSld>
@@ -2942,7 +3193,7 @@
               <a:rPr lang="en-US" dirty="0">
                 <a:sym typeface="Wingdings" panose="05000000000000000000" pitchFamily="2" charset="2"/>
               </a:rPr>
-              <a:t> cd lc101/class2</a:t>
+              <a:t> cd lc101/class2/examples</a:t>
             </a:r>
           </a:p>
           <a:p>
@@ -10763,7 +11014,7 @@
               <a:buChar char="●"/>
             </a:pPr>
             <a:r>
-              <a:rPr lang="en" sz="2400">
+              <a:rPr lang="en" sz="2400" dirty="0">
                 <a:solidFill>
                   <a:schemeClr val="dk1"/>
                 </a:solidFill>
@@ -10771,7 +11022,7 @@
               <a:t>Uses the </a:t>
             </a:r>
             <a:r>
-              <a:rPr lang="en" sz="2400" u="sng">
+              <a:rPr lang="en" sz="2400" u="sng" dirty="0">
                 <a:solidFill>
                   <a:schemeClr val="dk1"/>
                 </a:solidFill>
@@ -10779,14 +11030,14 @@
               <a:t>class attribute</a:t>
             </a:r>
             <a:r>
-              <a:rPr lang="en" sz="2400">
+              <a:rPr lang="en" sz="2400" dirty="0">
                 <a:solidFill>
                   <a:schemeClr val="dk1"/>
                 </a:solidFill>
               </a:rPr>
               <a:t> of an element</a:t>
             </a:r>
-            <a:endParaRPr sz="2400">
+            <a:endParaRPr sz="2400" dirty="0">
               <a:solidFill>
                 <a:schemeClr val="dk1"/>
               </a:solidFill>
@@ -10807,14 +11058,14 @@
               <a:buChar char="●"/>
             </a:pPr>
             <a:r>
-              <a:rPr lang="en" sz="2400">
+              <a:rPr lang="en" sz="2400" dirty="0">
                 <a:solidFill>
                   <a:schemeClr val="dk1"/>
                 </a:solidFill>
               </a:rPr>
               <a:t>&lt;h1 class="section-title"&gt;Welcome to LC101&lt;/h1&gt;</a:t>
             </a:r>
-            <a:endParaRPr sz="2400">
+            <a:endParaRPr sz="2400" dirty="0">
               <a:solidFill>
                 <a:schemeClr val="dk1"/>
               </a:solidFill>
@@ -10835,14 +11086,14 @@
               <a:buChar char="●"/>
             </a:pPr>
             <a:r>
-              <a:rPr lang="en" sz="2400">
+              <a:rPr lang="en" sz="2400" dirty="0">
                 <a:solidFill>
                   <a:schemeClr val="dk1"/>
                 </a:solidFill>
               </a:rPr>
               <a:t>&lt;style type="text/css"&gt;</a:t>
             </a:r>
-            <a:endParaRPr sz="2400">
+            <a:endParaRPr sz="2400" dirty="0">
               <a:solidFill>
                 <a:schemeClr val="dk1"/>
               </a:solidFill>
@@ -10859,14 +11110,14 @@
               <a:buNone/>
             </a:pPr>
             <a:r>
-              <a:rPr lang="en" sz="2400">
+              <a:rPr lang="en" sz="2400" dirty="0">
                 <a:solidFill>
                   <a:schemeClr val="dk1"/>
                 </a:solidFill>
               </a:rPr>
               <a:t>		.section-title {</a:t>
             </a:r>
-            <a:endParaRPr sz="2400">
+            <a:endParaRPr sz="2400" dirty="0">
               <a:solidFill>
                 <a:schemeClr val="dk1"/>
               </a:solidFill>
@@ -10883,14 +11134,14 @@
               <a:buNone/>
             </a:pPr>
             <a:r>
-              <a:rPr lang="en" sz="2400">
+              <a:rPr lang="en" sz="2400" dirty="0">
                 <a:solidFill>
                   <a:schemeClr val="dk1"/>
                 </a:solidFill>
               </a:rPr>
               <a:t>			font-size: 20px;</a:t>
             </a:r>
-            <a:endParaRPr sz="2400">
+            <a:endParaRPr sz="2400" dirty="0">
               <a:solidFill>
                 <a:schemeClr val="dk1"/>
               </a:solidFill>
@@ -10907,14 +11158,14 @@
               <a:buNone/>
             </a:pPr>
             <a:r>
-              <a:rPr lang="en" sz="2400">
+              <a:rPr lang="en" sz="2400" dirty="0">
                 <a:solidFill>
                   <a:schemeClr val="dk1"/>
                 </a:solidFill>
               </a:rPr>
               <a:t>			text-align: center;</a:t>
             </a:r>
-            <a:endParaRPr sz="2400">
+            <a:endParaRPr sz="2400" dirty="0">
               <a:solidFill>
                 <a:schemeClr val="dk1"/>
               </a:solidFill>
@@ -10931,14 +11182,14 @@
               <a:buNone/>
             </a:pPr>
             <a:r>
-              <a:rPr lang="en" sz="2400">
+              <a:rPr lang="en" sz="2400" dirty="0">
                 <a:solidFill>
                   <a:schemeClr val="dk1"/>
                 </a:solidFill>
               </a:rPr>
               <a:t>}</a:t>
             </a:r>
-            <a:endParaRPr sz="2400">
+            <a:endParaRPr sz="2400" dirty="0">
               <a:solidFill>
                 <a:schemeClr val="dk1"/>
               </a:solidFill>
@@ -10955,14 +11206,14 @@
               <a:buNone/>
             </a:pPr>
             <a:r>
-              <a:rPr lang="en" sz="2400">
+              <a:rPr lang="en" sz="2400" dirty="0">
                 <a:solidFill>
                   <a:schemeClr val="dk1"/>
                 </a:solidFill>
               </a:rPr>
               <a:t>&lt;/style&gt;</a:t>
             </a:r>
-            <a:endParaRPr sz="2400">
+            <a:endParaRPr sz="2400" dirty="0">
               <a:solidFill>
                 <a:schemeClr val="dk1"/>
               </a:solidFill>
@@ -10981,7 +11232,7 @@
               </a:spcAft>
               <a:buNone/>
             </a:pPr>
-            <a:endParaRPr sz="2400">
+            <a:endParaRPr sz="2400" dirty="0">
               <a:solidFill>
                 <a:srgbClr val="FFFFFF"/>
               </a:solidFill>
@@ -11000,7 +11251,7 @@
               </a:spcAft>
               <a:buNone/>
             </a:pPr>
-            <a:endParaRPr sz="2400">
+            <a:endParaRPr sz="2400" dirty="0">
               <a:solidFill>
                 <a:schemeClr val="dk1"/>
               </a:solidFill>
@@ -11019,7 +11270,7 @@
               </a:spcAft>
               <a:buNone/>
             </a:pPr>
-            <a:endParaRPr sz="2200">
+            <a:endParaRPr sz="2200" dirty="0">
               <a:solidFill>
                 <a:srgbClr val="FFFFFF"/>
               </a:solidFill>
@@ -11038,7 +11289,7 @@
               </a:spcAft>
               <a:buNone/>
             </a:pPr>
-            <a:endParaRPr sz="2200">
+            <a:endParaRPr sz="2200" dirty="0">
               <a:solidFill>
                 <a:srgbClr val="FFFFFF"/>
               </a:solidFill>
@@ -11057,7 +11308,7 @@
               </a:spcAft>
               <a:buNone/>
             </a:pPr>
-            <a:endParaRPr sz="2400">
+            <a:endParaRPr sz="2400" dirty="0">
               <a:solidFill>
                 <a:srgbClr val="FFFFFF"/>
               </a:solidFill>
@@ -11073,7 +11324,7 @@
               </a:spcAft>
               <a:buNone/>
             </a:pPr>
-            <a:endParaRPr sz="2400">
+            <a:endParaRPr sz="2400" dirty="0">
               <a:solidFill>
                 <a:srgbClr val="FFFFFF"/>
               </a:solidFill>
@@ -15961,6 +16212,1049 @@
                                           <p:spTgt spid="116">
                                             <p:txEl>
                                               <p:pRg st="7" end="7"/>
+                                            </p:txEl>
+                                          </p:spTgt>
+                                        </p:tgtEl>
+                                      </p:cBhvr>
+                                    </p:animEffect>
+                                  </p:childTnLst>
+                                </p:cTn>
+                              </p:par>
+                            </p:childTnLst>
+                          </p:cTn>
+                        </p:par>
+                      </p:childTnLst>
+                    </p:cTn>
+                  </p:par>
+                </p:childTnLst>
+              </p:cTn>
+              <p:prevCondLst>
+                <p:cond evt="onPrev" delay="0">
+                  <p:tgtEl>
+                    <p:sldTgt/>
+                  </p:tgtEl>
+                </p:cond>
+              </p:prevCondLst>
+              <p:nextCondLst>
+                <p:cond evt="onNext" delay="0">
+                  <p:tgtEl>
+                    <p:sldTgt/>
+                  </p:tgtEl>
+                </p:cond>
+              </p:nextCondLst>
+            </p:seq>
+          </p:childTnLst>
+        </p:cTn>
+      </p:par>
+    </p:tnLst>
+  </p:timing>
+</p:sld>
+</file>
+
+<file path=ppt/slides/slide22.xml><?xml version="1.0" encoding="utf-8"?>
+<p:sld xmlns:a="http://schemas.openxmlformats.org/drawingml/2006/main" xmlns:r="http://schemas.openxmlformats.org/officeDocument/2006/relationships" xmlns:p="http://schemas.openxmlformats.org/presentationml/2006/main">
+  <p:cSld>
+    <p:spTree>
+      <p:nvGrpSpPr>
+        <p:cNvPr id="1" name=""/>
+        <p:cNvGrpSpPr/>
+        <p:nvPr/>
+      </p:nvGrpSpPr>
+      <p:grpSpPr>
+        <a:xfrm>
+          <a:off x="0" y="0"/>
+          <a:ext cx="0" cy="0"/>
+          <a:chOff x="0" y="0"/>
+          <a:chExt cx="0" cy="0"/>
+        </a:xfrm>
+      </p:grpSpPr>
+      <p:sp>
+        <p:nvSpPr>
+          <p:cNvPr id="2" name="Title 1">
+            <a:extLst>
+              <a:ext uri="{FF2B5EF4-FFF2-40B4-BE49-F238E27FC236}">
+                <a16:creationId xmlns:a16="http://schemas.microsoft.com/office/drawing/2014/main" id="{52845B50-28E8-4574-9B84-7FF15E0D4F3B}"/>
+              </a:ext>
+            </a:extLst>
+          </p:cNvPr>
+          <p:cNvSpPr>
+            <a:spLocks noGrp="1"/>
+          </p:cNvSpPr>
+          <p:nvPr>
+            <p:ph type="title"/>
+          </p:nvPr>
+        </p:nvSpPr>
+        <p:spPr/>
+        <p:txBody>
+          <a:bodyPr/>
+          <a:lstStyle/>
+          <a:p>
+            <a:r>
+              <a:rPr lang="en-US" dirty="0"/>
+              <a:t>Example of Merging</a:t>
+            </a:r>
+          </a:p>
+        </p:txBody>
+      </p:sp>
+    </p:spTree>
+    <p:extLst>
+      <p:ext uri="{BB962C8B-B14F-4D97-AF65-F5344CB8AC3E}">
+        <p14:creationId xmlns:p14="http://schemas.microsoft.com/office/powerpoint/2010/main" val="2663078975"/>
+      </p:ext>
+    </p:extLst>
+  </p:cSld>
+  <p:clrMapOvr>
+    <a:masterClrMapping/>
+  </p:clrMapOvr>
+</p:sld>
+</file>
+
+<file path=ppt/slides/slide23.xml><?xml version="1.0" encoding="utf-8"?>
+<p:sld xmlns:a="http://schemas.openxmlformats.org/drawingml/2006/main" xmlns:r="http://schemas.openxmlformats.org/officeDocument/2006/relationships" xmlns:p="http://schemas.openxmlformats.org/presentationml/2006/main">
+  <p:cSld>
+    <p:spTree>
+      <p:nvGrpSpPr>
+        <p:cNvPr id="1" name=""/>
+        <p:cNvGrpSpPr/>
+        <p:nvPr/>
+      </p:nvGrpSpPr>
+      <p:grpSpPr>
+        <a:xfrm>
+          <a:off x="0" y="0"/>
+          <a:ext cx="0" cy="0"/>
+          <a:chOff x="0" y="0"/>
+          <a:chExt cx="0" cy="0"/>
+        </a:xfrm>
+      </p:grpSpPr>
+      <p:sp>
+        <p:nvSpPr>
+          <p:cNvPr id="2" name="Title 1">
+            <a:extLst>
+              <a:ext uri="{FF2B5EF4-FFF2-40B4-BE49-F238E27FC236}">
+                <a16:creationId xmlns:a16="http://schemas.microsoft.com/office/drawing/2014/main" id="{52845B50-28E8-4574-9B84-7FF15E0D4F3B}"/>
+              </a:ext>
+            </a:extLst>
+          </p:cNvPr>
+          <p:cNvSpPr>
+            <a:spLocks noGrp="1"/>
+          </p:cNvSpPr>
+          <p:nvPr>
+            <p:ph type="title"/>
+          </p:nvPr>
+        </p:nvSpPr>
+        <p:spPr/>
+        <p:txBody>
+          <a:bodyPr/>
+          <a:lstStyle/>
+          <a:p>
+            <a:r>
+              <a:rPr lang="en-US" dirty="0"/>
+              <a:t>Questions?</a:t>
+            </a:r>
+          </a:p>
+        </p:txBody>
+      </p:sp>
+    </p:spTree>
+    <p:extLst>
+      <p:ext uri="{BB962C8B-B14F-4D97-AF65-F5344CB8AC3E}">
+        <p14:creationId xmlns:p14="http://schemas.microsoft.com/office/powerpoint/2010/main" val="3116463916"/>
+      </p:ext>
+    </p:extLst>
+  </p:cSld>
+  <p:clrMapOvr>
+    <a:masterClrMapping/>
+  </p:clrMapOvr>
+</p:sld>
+</file>
+
+<file path=ppt/slides/slide24.xml><?xml version="1.0" encoding="utf-8"?>
+<p:sld xmlns:a="http://schemas.openxmlformats.org/drawingml/2006/main" xmlns:r="http://schemas.openxmlformats.org/officeDocument/2006/relationships" xmlns:p="http://schemas.openxmlformats.org/presentationml/2006/main">
+  <p:cSld>
+    <p:spTree>
+      <p:nvGrpSpPr>
+        <p:cNvPr id="1" name="Shape 114"/>
+        <p:cNvGrpSpPr/>
+        <p:nvPr/>
+      </p:nvGrpSpPr>
+      <p:grpSpPr>
+        <a:xfrm>
+          <a:off x="0" y="0"/>
+          <a:ext cx="0" cy="0"/>
+          <a:chOff x="0" y="0"/>
+          <a:chExt cx="0" cy="0"/>
+        </a:xfrm>
+      </p:grpSpPr>
+      <p:sp>
+        <p:nvSpPr>
+          <p:cNvPr id="115" name="Shape 115"/>
+          <p:cNvSpPr txBox="1">
+            <a:spLocks noGrp="1"/>
+          </p:cNvSpPr>
+          <p:nvPr>
+            <p:ph type="title"/>
+          </p:nvPr>
+        </p:nvSpPr>
+        <p:spPr>
+          <a:xfrm>
+            <a:off x="62275" y="-124550"/>
+            <a:ext cx="8769900" cy="524700"/>
+          </a:xfrm>
+          <a:prstGeom prst="rect">
+            <a:avLst/>
+          </a:prstGeom>
+        </p:spPr>
+        <p:txBody>
+          <a:bodyPr spcFirstLastPara="1" wrap="square" lIns="91425" tIns="91425" rIns="91425" bIns="91425" anchor="t" anchorCtr="0">
+            <a:noAutofit/>
+          </a:bodyPr>
+          <a:lstStyle/>
+          <a:p>
+            <a:pPr marL="0" lvl="0" indent="0" rtl="0">
+              <a:spcBef>
+                <a:spcPts val="0"/>
+              </a:spcBef>
+              <a:spcAft>
+                <a:spcPts val="0"/>
+              </a:spcAft>
+              <a:buNone/>
+            </a:pPr>
+            <a:r>
+              <a:rPr lang="en-US" sz="4000" dirty="0"/>
+              <a:t>Studio Walkthrough</a:t>
+            </a:r>
+            <a:endParaRPr sz="4000" dirty="0"/>
+          </a:p>
+        </p:txBody>
+      </p:sp>
+      <p:sp>
+        <p:nvSpPr>
+          <p:cNvPr id="116" name="Shape 116"/>
+          <p:cNvSpPr txBox="1"/>
+          <p:nvPr/>
+        </p:nvSpPr>
+        <p:spPr>
+          <a:xfrm>
+            <a:off x="418050" y="658225"/>
+            <a:ext cx="8619300" cy="4349700"/>
+          </a:xfrm>
+          <a:prstGeom prst="rect">
+            <a:avLst/>
+          </a:prstGeom>
+          <a:noFill/>
+          <a:ln>
+            <a:noFill/>
+          </a:ln>
+        </p:spPr>
+        <p:txBody>
+          <a:bodyPr spcFirstLastPara="1" wrap="square" lIns="91425" tIns="91425" rIns="91425" bIns="91425" anchor="t" anchorCtr="0">
+            <a:noAutofit/>
+          </a:bodyPr>
+          <a:lstStyle/>
+          <a:p>
+            <a:pPr marL="457200" lvl="0" indent="-374650">
+              <a:lnSpc>
+                <a:spcPct val="115000"/>
+              </a:lnSpc>
+              <a:buClr>
+                <a:srgbClr val="FFFFFF"/>
+              </a:buClr>
+              <a:buSzPts val="2300"/>
+              <a:buChar char="●"/>
+            </a:pPr>
+            <a:r>
+              <a:rPr lang="en-US" sz="2400" dirty="0">
+                <a:solidFill>
+                  <a:schemeClr val="dk1"/>
+                </a:solidFill>
+              </a:rPr>
+              <a:t>Why are remote repositories important?</a:t>
+            </a:r>
+            <a:endParaRPr lang="en-US" sz="2300" dirty="0">
+              <a:solidFill>
+                <a:srgbClr val="FFFFFF"/>
+              </a:solidFill>
+            </a:endParaRPr>
+          </a:p>
+          <a:p>
+            <a:pPr marL="914400" lvl="1" indent="-374650">
+              <a:lnSpc>
+                <a:spcPct val="115000"/>
+              </a:lnSpc>
+              <a:buClr>
+                <a:srgbClr val="FFFFFF"/>
+              </a:buClr>
+              <a:buSzPts val="2300"/>
+              <a:buChar char="○"/>
+            </a:pPr>
+            <a:r>
+              <a:rPr lang="en-US" sz="2300" dirty="0">
+                <a:solidFill>
+                  <a:srgbClr val="FFFFFF"/>
+                </a:solidFill>
+              </a:rPr>
+              <a:t>Back-up</a:t>
+            </a:r>
+          </a:p>
+          <a:p>
+            <a:pPr marL="914400" lvl="1" indent="-374650">
+              <a:lnSpc>
+                <a:spcPct val="115000"/>
+              </a:lnSpc>
+              <a:buClr>
+                <a:srgbClr val="FFFFFF"/>
+              </a:buClr>
+              <a:buSzPts val="2300"/>
+              <a:buChar char="○"/>
+            </a:pPr>
+            <a:r>
+              <a:rPr lang="en-US" sz="2300" dirty="0">
+                <a:solidFill>
+                  <a:srgbClr val="FFFFFF"/>
+                </a:solidFill>
+              </a:rPr>
+              <a:t>COLLABORATION</a:t>
+            </a:r>
+          </a:p>
+          <a:p>
+            <a:pPr marL="457200" lvl="0" indent="-381000" rtl="0">
+              <a:lnSpc>
+                <a:spcPct val="100000"/>
+              </a:lnSpc>
+              <a:spcBef>
+                <a:spcPts val="0"/>
+              </a:spcBef>
+              <a:spcAft>
+                <a:spcPts val="0"/>
+              </a:spcAft>
+              <a:buClr>
+                <a:schemeClr val="dk1"/>
+              </a:buClr>
+              <a:buSzPts val="2400"/>
+              <a:buChar char="●"/>
+            </a:pPr>
+            <a:endParaRPr lang="en-US" sz="2400" dirty="0">
+              <a:solidFill>
+                <a:schemeClr val="dk1"/>
+              </a:solidFill>
+            </a:endParaRPr>
+          </a:p>
+          <a:p>
+            <a:pPr marL="457200" lvl="0" indent="-381000" rtl="0">
+              <a:lnSpc>
+                <a:spcPct val="100000"/>
+              </a:lnSpc>
+              <a:spcBef>
+                <a:spcPts val="0"/>
+              </a:spcBef>
+              <a:spcAft>
+                <a:spcPts val="0"/>
+              </a:spcAft>
+              <a:buClr>
+                <a:schemeClr val="dk1"/>
+              </a:buClr>
+              <a:buSzPts val="2400"/>
+              <a:buChar char="●"/>
+            </a:pPr>
+            <a:endParaRPr lang="en-US" sz="2400" dirty="0">
+              <a:solidFill>
+                <a:schemeClr val="dk1"/>
+              </a:solidFill>
+            </a:endParaRPr>
+          </a:p>
+          <a:p>
+            <a:pPr marL="457200" lvl="0" indent="-374650">
+              <a:lnSpc>
+                <a:spcPct val="115000"/>
+              </a:lnSpc>
+              <a:buClr>
+                <a:srgbClr val="FFFFFF"/>
+              </a:buClr>
+              <a:buSzPts val="2300"/>
+              <a:buChar char="●"/>
+            </a:pPr>
+            <a:r>
+              <a:rPr lang="en-US" sz="2400" dirty="0">
+                <a:solidFill>
+                  <a:schemeClr val="dk1"/>
+                </a:solidFill>
+              </a:rPr>
+              <a:t>Studio: Fireside-Story</a:t>
+            </a:r>
+            <a:endParaRPr lang="en-US" sz="2300" dirty="0">
+              <a:solidFill>
+                <a:srgbClr val="FFFFFF"/>
+              </a:solidFill>
+            </a:endParaRPr>
+          </a:p>
+          <a:p>
+            <a:pPr marL="914400" lvl="1" indent="-374650">
+              <a:lnSpc>
+                <a:spcPct val="115000"/>
+              </a:lnSpc>
+              <a:buClr>
+                <a:srgbClr val="FFFFFF"/>
+              </a:buClr>
+              <a:buSzPts val="2300"/>
+              <a:buChar char="○"/>
+            </a:pPr>
+            <a:r>
+              <a:rPr lang="en-US" sz="2300" dirty="0">
+                <a:solidFill>
+                  <a:srgbClr val="FFFFFF"/>
+                </a:solidFill>
+              </a:rPr>
+              <a:t>Work in pairs.</a:t>
+            </a:r>
+          </a:p>
+          <a:p>
+            <a:pPr marL="914400" lvl="1" indent="-374650">
+              <a:lnSpc>
+                <a:spcPct val="115000"/>
+              </a:lnSpc>
+              <a:buClr>
+                <a:srgbClr val="FFFFFF"/>
+              </a:buClr>
+              <a:buSzPts val="2300"/>
+              <a:buChar char="○"/>
+            </a:pPr>
+            <a:r>
+              <a:rPr lang="en-US" sz="2300" dirty="0">
+                <a:solidFill>
+                  <a:srgbClr val="FFFFFF"/>
+                </a:solidFill>
+              </a:rPr>
+              <a:t>Write story (HTML and CSS) one sentence at a time.</a:t>
+            </a:r>
+          </a:p>
+          <a:p>
+            <a:pPr marL="914400" lvl="1" indent="-374650">
+              <a:lnSpc>
+                <a:spcPct val="115000"/>
+              </a:lnSpc>
+              <a:buClr>
+                <a:srgbClr val="FFFFFF"/>
+              </a:buClr>
+              <a:buSzPts val="2300"/>
+              <a:buChar char="○"/>
+            </a:pPr>
+            <a:r>
+              <a:rPr lang="en-US" sz="2300" dirty="0">
+                <a:solidFill>
+                  <a:srgbClr val="FFFFFF"/>
+                </a:solidFill>
+              </a:rPr>
+              <a:t>Directions are well-written, so no “real” walkthrough</a:t>
+            </a:r>
+          </a:p>
+          <a:p>
+            <a:pPr marL="914400" lvl="1" indent="-374650">
+              <a:lnSpc>
+                <a:spcPct val="115000"/>
+              </a:lnSpc>
+              <a:buClr>
+                <a:srgbClr val="FFFFFF"/>
+              </a:buClr>
+              <a:buSzPts val="2300"/>
+              <a:buChar char="○"/>
+            </a:pPr>
+            <a:endParaRPr lang="en-US" sz="2300" dirty="0">
+              <a:solidFill>
+                <a:srgbClr val="FFFFFF"/>
+              </a:solidFill>
+            </a:endParaRPr>
+          </a:p>
+          <a:p>
+            <a:pPr marL="457200" lvl="0" indent="-381000" rtl="0">
+              <a:lnSpc>
+                <a:spcPct val="100000"/>
+              </a:lnSpc>
+              <a:spcBef>
+                <a:spcPts val="0"/>
+              </a:spcBef>
+              <a:spcAft>
+                <a:spcPts val="0"/>
+              </a:spcAft>
+              <a:buClr>
+                <a:schemeClr val="dk1"/>
+              </a:buClr>
+              <a:buSzPts val="2400"/>
+              <a:buChar char="●"/>
+            </a:pPr>
+            <a:endParaRPr lang="en-US" sz="2400" dirty="0">
+              <a:solidFill>
+                <a:schemeClr val="dk1"/>
+              </a:solidFill>
+            </a:endParaRPr>
+          </a:p>
+          <a:p>
+            <a:pPr marL="76200" lvl="1">
+              <a:buClr>
+                <a:schemeClr val="dk1"/>
+              </a:buClr>
+              <a:buSzPts val="2400"/>
+            </a:pPr>
+            <a:r>
+              <a:rPr lang="en-US" sz="2200" dirty="0">
+                <a:solidFill>
+                  <a:srgbClr val="FFFFFF"/>
+                </a:solidFill>
+              </a:rPr>
+              <a:t>	</a:t>
+            </a:r>
+            <a:endParaRPr sz="2200" dirty="0">
+              <a:solidFill>
+                <a:srgbClr val="FFFFFF"/>
+              </a:solidFill>
+            </a:endParaRPr>
+          </a:p>
+          <a:p>
+            <a:pPr marL="0" lvl="0" indent="0" rtl="0">
+              <a:lnSpc>
+                <a:spcPct val="115000"/>
+              </a:lnSpc>
+              <a:spcBef>
+                <a:spcPts val="0"/>
+              </a:spcBef>
+              <a:spcAft>
+                <a:spcPts val="0"/>
+              </a:spcAft>
+              <a:buNone/>
+            </a:pPr>
+            <a:endParaRPr sz="2200" dirty="0">
+              <a:solidFill>
+                <a:srgbClr val="FFFFFF"/>
+              </a:solidFill>
+            </a:endParaRPr>
+          </a:p>
+          <a:p>
+            <a:pPr marL="0" marR="0" lvl="0" indent="0" algn="l" rtl="0">
+              <a:lnSpc>
+                <a:spcPct val="100000"/>
+              </a:lnSpc>
+              <a:spcBef>
+                <a:spcPts val="0"/>
+              </a:spcBef>
+              <a:spcAft>
+                <a:spcPts val="0"/>
+              </a:spcAft>
+              <a:buNone/>
+            </a:pPr>
+            <a:endParaRPr sz="2400" dirty="0">
+              <a:solidFill>
+                <a:srgbClr val="FFFFFF"/>
+              </a:solidFill>
+            </a:endParaRPr>
+          </a:p>
+          <a:p>
+            <a:pPr marL="0" lvl="0" indent="0" rtl="0">
+              <a:spcBef>
+                <a:spcPts val="0"/>
+              </a:spcBef>
+              <a:spcAft>
+                <a:spcPts val="0"/>
+              </a:spcAft>
+              <a:buNone/>
+            </a:pPr>
+            <a:endParaRPr sz="2400" dirty="0">
+              <a:solidFill>
+                <a:srgbClr val="FFFFFF"/>
+              </a:solidFill>
+            </a:endParaRPr>
+          </a:p>
+        </p:txBody>
+      </p:sp>
+    </p:spTree>
+    <p:extLst>
+      <p:ext uri="{BB962C8B-B14F-4D97-AF65-F5344CB8AC3E}">
+        <p14:creationId xmlns:p14="http://schemas.microsoft.com/office/powerpoint/2010/main" val="3596875103"/>
+      </p:ext>
+    </p:extLst>
+  </p:cSld>
+  <p:clrMapOvr>
+    <a:masterClrMapping/>
+  </p:clrMapOvr>
+  <p:timing>
+    <p:tnLst>
+      <p:par>
+        <p:cTn id="1" dur="indefinite" restart="never" nodeType="tmRoot">
+          <p:childTnLst>
+            <p:seq concurrent="1" nextAc="seek">
+              <p:cTn id="2" dur="indefinite" nodeType="mainSeq">
+                <p:childTnLst>
+                  <p:par>
+                    <p:cTn id="3" fill="hold">
+                      <p:stCondLst>
+                        <p:cond delay="indefinite"/>
+                      </p:stCondLst>
+                      <p:childTnLst>
+                        <p:par>
+                          <p:cTn id="4" fill="hold">
+                            <p:stCondLst>
+                              <p:cond delay="0"/>
+                            </p:stCondLst>
+                            <p:childTnLst>
+                              <p:par>
+                                <p:cTn id="5" presetID="10" presetClass="entr" presetSubtype="0" fill="hold" nodeType="clickEffect">
+                                  <p:stCondLst>
+                                    <p:cond delay="0"/>
+                                  </p:stCondLst>
+                                  <p:childTnLst>
+                                    <p:set>
+                                      <p:cBhvr>
+                                        <p:cTn id="6" dur="1" fill="hold">
+                                          <p:stCondLst>
+                                            <p:cond delay="0"/>
+                                          </p:stCondLst>
+                                        </p:cTn>
+                                        <p:tgtEl>
+                                          <p:spTgt spid="116">
+                                            <p:txEl>
+                                              <p:pRg st="0" end="0"/>
+                                            </p:txEl>
+                                          </p:spTgt>
+                                        </p:tgtEl>
+                                        <p:attrNameLst>
+                                          <p:attrName>style.visibility</p:attrName>
+                                        </p:attrNameLst>
+                                      </p:cBhvr>
+                                      <p:to>
+                                        <p:strVal val="visible"/>
+                                      </p:to>
+                                    </p:set>
+                                    <p:animEffect transition="in" filter="fade">
+                                      <p:cBhvr>
+                                        <p:cTn id="7" dur="1000"/>
+                                        <p:tgtEl>
+                                          <p:spTgt spid="116">
+                                            <p:txEl>
+                                              <p:pRg st="0" end="0"/>
+                                            </p:txEl>
+                                          </p:spTgt>
+                                        </p:tgtEl>
+                                      </p:cBhvr>
+                                    </p:animEffect>
+                                  </p:childTnLst>
+                                </p:cTn>
+                              </p:par>
+                            </p:childTnLst>
+                          </p:cTn>
+                        </p:par>
+                      </p:childTnLst>
+                    </p:cTn>
+                  </p:par>
+                  <p:par>
+                    <p:cTn id="8" fill="hold">
+                      <p:stCondLst>
+                        <p:cond delay="indefinite"/>
+                      </p:stCondLst>
+                      <p:childTnLst>
+                        <p:par>
+                          <p:cTn id="9" fill="hold">
+                            <p:stCondLst>
+                              <p:cond delay="0"/>
+                            </p:stCondLst>
+                            <p:childTnLst>
+                              <p:par>
+                                <p:cTn id="10" presetID="10" presetClass="entr" presetSubtype="0" fill="hold" nodeType="clickEffect">
+                                  <p:stCondLst>
+                                    <p:cond delay="0"/>
+                                  </p:stCondLst>
+                                  <p:childTnLst>
+                                    <p:set>
+                                      <p:cBhvr>
+                                        <p:cTn id="11" dur="1" fill="hold">
+                                          <p:stCondLst>
+                                            <p:cond delay="0"/>
+                                          </p:stCondLst>
+                                        </p:cTn>
+                                        <p:tgtEl>
+                                          <p:spTgt spid="116">
+                                            <p:txEl>
+                                              <p:pRg st="1" end="1"/>
+                                            </p:txEl>
+                                          </p:spTgt>
+                                        </p:tgtEl>
+                                        <p:attrNameLst>
+                                          <p:attrName>style.visibility</p:attrName>
+                                        </p:attrNameLst>
+                                      </p:cBhvr>
+                                      <p:to>
+                                        <p:strVal val="visible"/>
+                                      </p:to>
+                                    </p:set>
+                                    <p:animEffect transition="in" filter="fade">
+                                      <p:cBhvr>
+                                        <p:cTn id="12" dur="1000"/>
+                                        <p:tgtEl>
+                                          <p:spTgt spid="116">
+                                            <p:txEl>
+                                              <p:pRg st="1" end="1"/>
+                                            </p:txEl>
+                                          </p:spTgt>
+                                        </p:tgtEl>
+                                      </p:cBhvr>
+                                    </p:animEffect>
+                                  </p:childTnLst>
+                                </p:cTn>
+                              </p:par>
+                            </p:childTnLst>
+                          </p:cTn>
+                        </p:par>
+                      </p:childTnLst>
+                    </p:cTn>
+                  </p:par>
+                  <p:par>
+                    <p:cTn id="13" fill="hold">
+                      <p:stCondLst>
+                        <p:cond delay="indefinite"/>
+                      </p:stCondLst>
+                      <p:childTnLst>
+                        <p:par>
+                          <p:cTn id="14" fill="hold">
+                            <p:stCondLst>
+                              <p:cond delay="0"/>
+                            </p:stCondLst>
+                            <p:childTnLst>
+                              <p:par>
+                                <p:cTn id="15" presetID="10" presetClass="entr" presetSubtype="0" fill="hold" nodeType="clickEffect">
+                                  <p:stCondLst>
+                                    <p:cond delay="0"/>
+                                  </p:stCondLst>
+                                  <p:childTnLst>
+                                    <p:set>
+                                      <p:cBhvr>
+                                        <p:cTn id="16" dur="1" fill="hold">
+                                          <p:stCondLst>
+                                            <p:cond delay="0"/>
+                                          </p:stCondLst>
+                                        </p:cTn>
+                                        <p:tgtEl>
+                                          <p:spTgt spid="116">
+                                            <p:txEl>
+                                              <p:pRg st="2" end="2"/>
+                                            </p:txEl>
+                                          </p:spTgt>
+                                        </p:tgtEl>
+                                        <p:attrNameLst>
+                                          <p:attrName>style.visibility</p:attrName>
+                                        </p:attrNameLst>
+                                      </p:cBhvr>
+                                      <p:to>
+                                        <p:strVal val="visible"/>
+                                      </p:to>
+                                    </p:set>
+                                    <p:animEffect transition="in" filter="fade">
+                                      <p:cBhvr>
+                                        <p:cTn id="17" dur="1000"/>
+                                        <p:tgtEl>
+                                          <p:spTgt spid="116">
+                                            <p:txEl>
+                                              <p:pRg st="2" end="2"/>
+                                            </p:txEl>
+                                          </p:spTgt>
+                                        </p:tgtEl>
+                                      </p:cBhvr>
+                                    </p:animEffect>
+                                  </p:childTnLst>
+                                </p:cTn>
+                              </p:par>
+                            </p:childTnLst>
+                          </p:cTn>
+                        </p:par>
+                      </p:childTnLst>
+                    </p:cTn>
+                  </p:par>
+                  <p:par>
+                    <p:cTn id="18" fill="hold">
+                      <p:stCondLst>
+                        <p:cond delay="indefinite"/>
+                      </p:stCondLst>
+                      <p:childTnLst>
+                        <p:par>
+                          <p:cTn id="19" fill="hold">
+                            <p:stCondLst>
+                              <p:cond delay="0"/>
+                            </p:stCondLst>
+                            <p:childTnLst>
+                              <p:par>
+                                <p:cTn id="20" presetID="10" presetClass="entr" presetSubtype="0" fill="hold" nodeType="clickEffect">
+                                  <p:stCondLst>
+                                    <p:cond delay="0"/>
+                                  </p:stCondLst>
+                                  <p:childTnLst>
+                                    <p:set>
+                                      <p:cBhvr>
+                                        <p:cTn id="21" dur="1" fill="hold">
+                                          <p:stCondLst>
+                                            <p:cond delay="0"/>
+                                          </p:stCondLst>
+                                        </p:cTn>
+                                        <p:tgtEl>
+                                          <p:spTgt spid="116">
+                                            <p:txEl>
+                                              <p:pRg st="5" end="5"/>
+                                            </p:txEl>
+                                          </p:spTgt>
+                                        </p:tgtEl>
+                                        <p:attrNameLst>
+                                          <p:attrName>style.visibility</p:attrName>
+                                        </p:attrNameLst>
+                                      </p:cBhvr>
+                                      <p:to>
+                                        <p:strVal val="visible"/>
+                                      </p:to>
+                                    </p:set>
+                                    <p:animEffect transition="in" filter="fade">
+                                      <p:cBhvr>
+                                        <p:cTn id="22" dur="1000"/>
+                                        <p:tgtEl>
+                                          <p:spTgt spid="116">
+                                            <p:txEl>
+                                              <p:pRg st="5" end="5"/>
+                                            </p:txEl>
+                                          </p:spTgt>
+                                        </p:tgtEl>
+                                      </p:cBhvr>
+                                    </p:animEffect>
+                                  </p:childTnLst>
+                                </p:cTn>
+                              </p:par>
+                            </p:childTnLst>
+                          </p:cTn>
+                        </p:par>
+                      </p:childTnLst>
+                    </p:cTn>
+                  </p:par>
+                  <p:par>
+                    <p:cTn id="23" fill="hold">
+                      <p:stCondLst>
+                        <p:cond delay="indefinite"/>
+                      </p:stCondLst>
+                      <p:childTnLst>
+                        <p:par>
+                          <p:cTn id="24" fill="hold">
+                            <p:stCondLst>
+                              <p:cond delay="0"/>
+                            </p:stCondLst>
+                            <p:childTnLst>
+                              <p:par>
+                                <p:cTn id="25" presetID="10" presetClass="entr" presetSubtype="0" fill="hold" nodeType="clickEffect">
+                                  <p:stCondLst>
+                                    <p:cond delay="0"/>
+                                  </p:stCondLst>
+                                  <p:childTnLst>
+                                    <p:set>
+                                      <p:cBhvr>
+                                        <p:cTn id="26" dur="1" fill="hold">
+                                          <p:stCondLst>
+                                            <p:cond delay="0"/>
+                                          </p:stCondLst>
+                                        </p:cTn>
+                                        <p:tgtEl>
+                                          <p:spTgt spid="116">
+                                            <p:txEl>
+                                              <p:pRg st="6" end="6"/>
+                                            </p:txEl>
+                                          </p:spTgt>
+                                        </p:tgtEl>
+                                        <p:attrNameLst>
+                                          <p:attrName>style.visibility</p:attrName>
+                                        </p:attrNameLst>
+                                      </p:cBhvr>
+                                      <p:to>
+                                        <p:strVal val="visible"/>
+                                      </p:to>
+                                    </p:set>
+                                    <p:animEffect transition="in" filter="fade">
+                                      <p:cBhvr>
+                                        <p:cTn id="27" dur="1000"/>
+                                        <p:tgtEl>
+                                          <p:spTgt spid="116">
+                                            <p:txEl>
+                                              <p:pRg st="6" end="6"/>
+                                            </p:txEl>
+                                          </p:spTgt>
+                                        </p:tgtEl>
+                                      </p:cBhvr>
+                                    </p:animEffect>
+                                  </p:childTnLst>
+                                </p:cTn>
+                              </p:par>
+                            </p:childTnLst>
+                          </p:cTn>
+                        </p:par>
+                      </p:childTnLst>
+                    </p:cTn>
+                  </p:par>
+                  <p:par>
+                    <p:cTn id="28" fill="hold">
+                      <p:stCondLst>
+                        <p:cond delay="indefinite"/>
+                      </p:stCondLst>
+                      <p:childTnLst>
+                        <p:par>
+                          <p:cTn id="29" fill="hold">
+                            <p:stCondLst>
+                              <p:cond delay="0"/>
+                            </p:stCondLst>
+                            <p:childTnLst>
+                              <p:par>
+                                <p:cTn id="30" presetID="10" presetClass="entr" presetSubtype="0" fill="hold" nodeType="clickEffect">
+                                  <p:stCondLst>
+                                    <p:cond delay="0"/>
+                                  </p:stCondLst>
+                                  <p:childTnLst>
+                                    <p:set>
+                                      <p:cBhvr>
+                                        <p:cTn id="31" dur="1" fill="hold">
+                                          <p:stCondLst>
+                                            <p:cond delay="0"/>
+                                          </p:stCondLst>
+                                        </p:cTn>
+                                        <p:tgtEl>
+                                          <p:spTgt spid="116">
+                                            <p:txEl>
+                                              <p:pRg st="7" end="7"/>
+                                            </p:txEl>
+                                          </p:spTgt>
+                                        </p:tgtEl>
+                                        <p:attrNameLst>
+                                          <p:attrName>style.visibility</p:attrName>
+                                        </p:attrNameLst>
+                                      </p:cBhvr>
+                                      <p:to>
+                                        <p:strVal val="visible"/>
+                                      </p:to>
+                                    </p:set>
+                                    <p:animEffect transition="in" filter="fade">
+                                      <p:cBhvr>
+                                        <p:cTn id="32" dur="1000"/>
+                                        <p:tgtEl>
+                                          <p:spTgt spid="116">
+                                            <p:txEl>
+                                              <p:pRg st="7" end="7"/>
+                                            </p:txEl>
+                                          </p:spTgt>
+                                        </p:tgtEl>
+                                      </p:cBhvr>
+                                    </p:animEffect>
+                                  </p:childTnLst>
+                                </p:cTn>
+                              </p:par>
+                            </p:childTnLst>
+                          </p:cTn>
+                        </p:par>
+                      </p:childTnLst>
+                    </p:cTn>
+                  </p:par>
+                  <p:par>
+                    <p:cTn id="33" fill="hold">
+                      <p:stCondLst>
+                        <p:cond delay="indefinite"/>
+                      </p:stCondLst>
+                      <p:childTnLst>
+                        <p:par>
+                          <p:cTn id="34" fill="hold">
+                            <p:stCondLst>
+                              <p:cond delay="0"/>
+                            </p:stCondLst>
+                            <p:childTnLst>
+                              <p:par>
+                                <p:cTn id="35" presetID="10" presetClass="entr" presetSubtype="0" fill="hold" nodeType="clickEffect">
+                                  <p:stCondLst>
+                                    <p:cond delay="0"/>
+                                  </p:stCondLst>
+                                  <p:childTnLst>
+                                    <p:set>
+                                      <p:cBhvr>
+                                        <p:cTn id="36" dur="1" fill="hold">
+                                          <p:stCondLst>
+                                            <p:cond delay="0"/>
+                                          </p:stCondLst>
+                                        </p:cTn>
+                                        <p:tgtEl>
+                                          <p:spTgt spid="116">
+                                            <p:txEl>
+                                              <p:pRg st="8" end="8"/>
+                                            </p:txEl>
+                                          </p:spTgt>
+                                        </p:tgtEl>
+                                        <p:attrNameLst>
+                                          <p:attrName>style.visibility</p:attrName>
+                                        </p:attrNameLst>
+                                      </p:cBhvr>
+                                      <p:to>
+                                        <p:strVal val="visible"/>
+                                      </p:to>
+                                    </p:set>
+                                    <p:animEffect transition="in" filter="fade">
+                                      <p:cBhvr>
+                                        <p:cTn id="37" dur="1000"/>
+                                        <p:tgtEl>
+                                          <p:spTgt spid="116">
+                                            <p:txEl>
+                                              <p:pRg st="8" end="8"/>
+                                            </p:txEl>
+                                          </p:spTgt>
+                                        </p:tgtEl>
+                                      </p:cBhvr>
+                                    </p:animEffect>
+                                  </p:childTnLst>
+                                </p:cTn>
+                              </p:par>
+                            </p:childTnLst>
+                          </p:cTn>
+                        </p:par>
+                      </p:childTnLst>
+                    </p:cTn>
+                  </p:par>
+                  <p:par>
+                    <p:cTn id="38" fill="hold">
+                      <p:stCondLst>
+                        <p:cond delay="indefinite"/>
+                      </p:stCondLst>
+                      <p:childTnLst>
+                        <p:par>
+                          <p:cTn id="39" fill="hold">
+                            <p:stCondLst>
+                              <p:cond delay="0"/>
+                            </p:stCondLst>
+                            <p:childTnLst>
+                              <p:par>
+                                <p:cTn id="40" presetID="10" presetClass="entr" presetSubtype="0" fill="hold" nodeType="clickEffect">
+                                  <p:stCondLst>
+                                    <p:cond delay="0"/>
+                                  </p:stCondLst>
+                                  <p:childTnLst>
+                                    <p:set>
+                                      <p:cBhvr>
+                                        <p:cTn id="41" dur="1" fill="hold">
+                                          <p:stCondLst>
+                                            <p:cond delay="0"/>
+                                          </p:stCondLst>
+                                        </p:cTn>
+                                        <p:tgtEl>
+                                          <p:spTgt spid="116">
+                                            <p:txEl>
+                                              <p:pRg st="11" end="11"/>
+                                            </p:txEl>
+                                          </p:spTgt>
+                                        </p:tgtEl>
+                                        <p:attrNameLst>
+                                          <p:attrName>style.visibility</p:attrName>
+                                        </p:attrNameLst>
+                                      </p:cBhvr>
+                                      <p:to>
+                                        <p:strVal val="visible"/>
+                                      </p:to>
+                                    </p:set>
+                                    <p:animEffect transition="in" filter="fade">
+                                      <p:cBhvr>
+                                        <p:cTn id="42" dur="1000"/>
+                                        <p:tgtEl>
+                                          <p:spTgt spid="116">
+                                            <p:txEl>
+                                              <p:pRg st="11" end="11"/>
                                             </p:txEl>
                                           </p:spTgt>
                                         </p:tgtEl>

</xml_diff>